<commit_message>
Removed Apogy Logo from the one pager
</commit_message>
<xml_diff>
--- a/doc/ca.gc.asc_csa.apogy.doc/presentations/ApogyOnePager.pptx
+++ b/doc/ca.gc.asc_csa.apogy.doc/presentations/ApogyOnePager.pptx
@@ -288,7 +288,7 @@
           <a:p>
             <a:fld id="{FDAF5371-0E45-439F-A0EA-8CA06650671C}" type="datetimeFigureOut">
               <a:rPr lang="en-US" smtClean="0"/>
-              <a:t>12/3/2015</a:t>
+              <a:t>3/22/2016</a:t>
             </a:fld>
             <a:endParaRPr lang="en-US"/>
           </a:p>
@@ -453,7 +453,7 @@
           <a:p>
             <a:fld id="{FDAF5371-0E45-439F-A0EA-8CA06650671C}" type="datetimeFigureOut">
               <a:rPr lang="en-US" smtClean="0"/>
-              <a:t>12/3/2015</a:t>
+              <a:t>3/22/2016</a:t>
             </a:fld>
             <a:endParaRPr lang="en-US"/>
           </a:p>
@@ -628,7 +628,7 @@
           <a:p>
             <a:fld id="{FDAF5371-0E45-439F-A0EA-8CA06650671C}" type="datetimeFigureOut">
               <a:rPr lang="en-US" smtClean="0"/>
-              <a:t>12/3/2015</a:t>
+              <a:t>3/22/2016</a:t>
             </a:fld>
             <a:endParaRPr lang="en-US"/>
           </a:p>
@@ -793,7 +793,7 @@
           <a:p>
             <a:fld id="{FDAF5371-0E45-439F-A0EA-8CA06650671C}" type="datetimeFigureOut">
               <a:rPr lang="en-US" smtClean="0"/>
-              <a:t>12/3/2015</a:t>
+              <a:t>3/22/2016</a:t>
             </a:fld>
             <a:endParaRPr lang="en-US"/>
           </a:p>
@@ -1034,7 +1034,7 @@
           <a:p>
             <a:fld id="{FDAF5371-0E45-439F-A0EA-8CA06650671C}" type="datetimeFigureOut">
               <a:rPr lang="en-US" smtClean="0"/>
-              <a:t>12/3/2015</a:t>
+              <a:t>3/22/2016</a:t>
             </a:fld>
             <a:endParaRPr lang="en-US"/>
           </a:p>
@@ -1317,7 +1317,7 @@
           <a:p>
             <a:fld id="{FDAF5371-0E45-439F-A0EA-8CA06650671C}" type="datetimeFigureOut">
               <a:rPr lang="en-US" smtClean="0"/>
-              <a:t>12/3/2015</a:t>
+              <a:t>3/22/2016</a:t>
             </a:fld>
             <a:endParaRPr lang="en-US"/>
           </a:p>
@@ -1734,7 +1734,7 @@
           <a:p>
             <a:fld id="{FDAF5371-0E45-439F-A0EA-8CA06650671C}" type="datetimeFigureOut">
               <a:rPr lang="en-US" smtClean="0"/>
-              <a:t>12/3/2015</a:t>
+              <a:t>3/22/2016</a:t>
             </a:fld>
             <a:endParaRPr lang="en-US"/>
           </a:p>
@@ -1847,7 +1847,7 @@
           <a:p>
             <a:fld id="{FDAF5371-0E45-439F-A0EA-8CA06650671C}" type="datetimeFigureOut">
               <a:rPr lang="en-US" smtClean="0"/>
-              <a:t>12/3/2015</a:t>
+              <a:t>3/22/2016</a:t>
             </a:fld>
             <a:endParaRPr lang="en-US"/>
           </a:p>
@@ -1937,7 +1937,7 @@
           <a:p>
             <a:fld id="{FDAF5371-0E45-439F-A0EA-8CA06650671C}" type="datetimeFigureOut">
               <a:rPr lang="en-US" smtClean="0"/>
-              <a:t>12/3/2015</a:t>
+              <a:t>3/22/2016</a:t>
             </a:fld>
             <a:endParaRPr lang="en-US"/>
           </a:p>
@@ -2209,7 +2209,7 @@
           <a:p>
             <a:fld id="{FDAF5371-0E45-439F-A0EA-8CA06650671C}" type="datetimeFigureOut">
               <a:rPr lang="en-US" smtClean="0"/>
-              <a:t>12/3/2015</a:t>
+              <a:t>3/22/2016</a:t>
             </a:fld>
             <a:endParaRPr lang="en-US"/>
           </a:p>
@@ -2457,7 +2457,7 @@
           <a:p>
             <a:fld id="{FDAF5371-0E45-439F-A0EA-8CA06650671C}" type="datetimeFigureOut">
               <a:rPr lang="en-US" smtClean="0"/>
-              <a:t>12/3/2015</a:t>
+              <a:t>3/22/2016</a:t>
             </a:fld>
             <a:endParaRPr lang="en-US"/>
           </a:p>
@@ -2689,7 +2689,7 @@
           <a:p>
             <a:fld id="{FDAF5371-0E45-439F-A0EA-8CA06650671C}" type="datetimeFigureOut">
               <a:rPr lang="en-US" smtClean="0"/>
-              <a:t>12/3/2015</a:t>
+              <a:t>3/22/2016</a:t>
             </a:fld>
             <a:endParaRPr lang="en-US"/>
           </a:p>
@@ -3397,30 +3397,6 @@
       </p:pic>
       <p:pic>
         <p:nvPicPr>
-          <p:cNvPr id="17" name="Picture 16" descr="symphony_icon_1024x958.png"/>
-          <p:cNvPicPr>
-            <a:picLocks noChangeAspect="1"/>
-          </p:cNvPicPr>
-          <p:nvPr/>
-        </p:nvPicPr>
-        <p:blipFill>
-          <a:blip r:embed="rId6" cstate="print"/>
-          <a:stretch>
-            <a:fillRect/>
-          </a:stretch>
-        </p:blipFill>
-        <p:spPr>
-          <a:xfrm>
-            <a:off x="179512" y="188640"/>
-            <a:ext cx="1154533" cy="1080120"/>
-          </a:xfrm>
-          <a:prstGeom prst="rect">
-            <a:avLst/>
-          </a:prstGeom>
-        </p:spPr>
-      </p:pic>
-      <p:pic>
-        <p:nvPicPr>
           <p:cNvPr id="18" name="Picture 1"/>
           <p:cNvPicPr>
             <a:picLocks noChangeAspect="1" noChangeArrowheads="1"/>
@@ -3428,7 +3404,7 @@
           <p:nvPr/>
         </p:nvPicPr>
         <p:blipFill>
-          <a:blip r:embed="rId7" cstate="print"/>
+          <a:blip r:embed="rId6" cstate="print"/>
           <a:srcRect/>
           <a:stretch>
             <a:fillRect/>
@@ -3463,7 +3439,7 @@
           <p:nvPr/>
         </p:nvPicPr>
         <p:blipFill>
-          <a:blip r:embed="rId8" cstate="print"/>
+          <a:blip r:embed="rId7" cstate="print"/>
           <a:srcRect/>
           <a:stretch>
             <a:fillRect/>
@@ -3502,7 +3478,7 @@
           <p:nvPr/>
         </p:nvPicPr>
         <p:blipFill>
-          <a:blip r:embed="rId9" cstate="print">
+          <a:blip r:embed="rId8" cstate="print">
             <a:extLst>
               <a:ext uri="{28A0092B-C50C-407E-A947-70E740481C1C}">
                 <a14:useLocalDpi xmlns:a14="http://schemas.microsoft.com/office/drawing/2010/main" val="0"/>
@@ -3561,7 +3537,7 @@
           <p:nvPr/>
         </p:nvPicPr>
         <p:blipFill>
-          <a:blip r:embed="rId10" cstate="print"/>
+          <a:blip r:embed="rId9" cstate="print"/>
           <a:srcRect/>
           <a:stretch>
             <a:fillRect/>
@@ -3598,7 +3574,7 @@
           <p:nvPr/>
         </p:nvPicPr>
         <p:blipFill>
-          <a:blip r:embed="rId11" cstate="print"/>
+          <a:blip r:embed="rId10" cstate="print"/>
           <a:stretch>
             <a:fillRect/>
           </a:stretch>
@@ -3627,7 +3603,7 @@
           <p:nvPr/>
         </p:nvPicPr>
         <p:blipFill>
-          <a:blip r:embed="rId12" cstate="print"/>
+          <a:blip r:embed="rId11" cstate="print"/>
           <a:srcRect t="63501" b="1140"/>
           <a:stretch>
             <a:fillRect/>
@@ -3657,7 +3633,7 @@
           <p:nvPr/>
         </p:nvPicPr>
         <p:blipFill>
-          <a:blip r:embed="rId13" cstate="print"/>
+          <a:blip r:embed="rId12" cstate="print"/>
           <a:srcRect/>
           <a:stretch>
             <a:fillRect/>
@@ -3692,11 +3668,11 @@
           <p:nvPr/>
         </p:nvPicPr>
         <p:blipFill>
-          <a:blip r:embed="rId14" cstate="print">
+          <a:blip r:embed="rId13" cstate="print">
             <a:extLst>
               <a:ext uri="{BEBA8EAE-BF5A-486C-A8C5-ECC9F3942E4B}">
                 <a14:imgProps xmlns:a14="http://schemas.microsoft.com/office/drawing/2010/main">
-                  <a14:imgLayer r:embed="rId15">
+                  <a14:imgLayer r:embed="rId14">
                     <a14:imgEffect>
                       <a14:brightnessContrast bright="30000"/>
                     </a14:imgEffect>
@@ -3739,11 +3715,11 @@
           <p:nvPr/>
         </p:nvPicPr>
         <p:blipFill>
-          <a:blip r:embed="rId16" cstate="print">
+          <a:blip r:embed="rId15" cstate="print">
             <a:extLst>
               <a:ext uri="{BEBA8EAE-BF5A-486C-A8C5-ECC9F3942E4B}">
                 <a14:imgProps xmlns:a14="http://schemas.microsoft.com/office/drawing/2010/main">
-                  <a14:imgLayer r:embed="rId17">
+                  <a14:imgLayer r:embed="rId16">
                     <a14:imgEffect>
                       <a14:brightnessContrast bright="50000"/>
                     </a14:imgEffect>
@@ -3785,7 +3761,7 @@
           <p:nvPr/>
         </p:nvPicPr>
         <p:blipFill>
-          <a:blip r:embed="rId18" cstate="print"/>
+          <a:blip r:embed="rId17" cstate="print"/>
           <a:stretch>
             <a:fillRect/>
           </a:stretch>
@@ -3816,7 +3792,7 @@
           <p:nvPr/>
         </p:nvPicPr>
         <p:blipFill>
-          <a:blip r:embed="rId19" cstate="print"/>
+          <a:blip r:embed="rId18" cstate="print"/>
           <a:srcRect b="15476"/>
           <a:stretch>
             <a:fillRect/>
@@ -3851,11 +3827,11 @@
           <p:nvPr/>
         </p:nvPicPr>
         <p:blipFill>
-          <a:blip r:embed="rId20" cstate="print">
+          <a:blip r:embed="rId19" cstate="print">
             <a:extLst>
               <a:ext uri="{BEBA8EAE-BF5A-486C-A8C5-ECC9F3942E4B}">
                 <a14:imgProps xmlns:a14="http://schemas.microsoft.com/office/drawing/2010/main">
-                  <a14:imgLayer r:embed="rId21">
+                  <a14:imgLayer r:embed="rId20">
                     <a14:imgEffect>
                       <a14:brightnessContrast bright="30000"/>
                     </a14:imgEffect>

</xml_diff>